<commit_message>
docs(readme): update project documentation
</commit_message>
<xml_diff>
--- a/lap_minggu2/LSS.pptx
+++ b/lap_minggu2/LSS.pptx
@@ -314,7 +314,7 @@
             <a:fld id="{1D8BD707-D9CF-40AE-B4C6-C98DA3205C09}" type="datetimeFigureOut">
               <a:rPr lang="en-US" smtClean="0"/>
               <a:pPr/>
-              <a:t>4/13/25</a:t>
+              <a:t>4/17/25</a:t>
             </a:fld>
             <a:endParaRPr lang="en-US"/>
           </a:p>
@@ -479,7 +479,7 @@
             <a:fld id="{1D8BD707-D9CF-40AE-B4C6-C98DA3205C09}" type="datetimeFigureOut">
               <a:rPr lang="en-US" smtClean="0"/>
               <a:pPr/>
-              <a:t>4/13/25</a:t>
+              <a:t>4/17/25</a:t>
             </a:fld>
             <a:endParaRPr lang="en-US"/>
           </a:p>
@@ -654,7 +654,7 @@
             <a:fld id="{1D8BD707-D9CF-40AE-B4C6-C98DA3205C09}" type="datetimeFigureOut">
               <a:rPr lang="en-US" smtClean="0"/>
               <a:pPr/>
-              <a:t>4/13/25</a:t>
+              <a:t>4/17/25</a:t>
             </a:fld>
             <a:endParaRPr lang="en-US"/>
           </a:p>
@@ -819,7 +819,7 @@
             <a:fld id="{1D8BD707-D9CF-40AE-B4C6-C98DA3205C09}" type="datetimeFigureOut">
               <a:rPr lang="en-US" smtClean="0"/>
               <a:pPr/>
-              <a:t>4/13/25</a:t>
+              <a:t>4/17/25</a:t>
             </a:fld>
             <a:endParaRPr lang="en-US"/>
           </a:p>
@@ -1061,7 +1061,7 @@
             <a:fld id="{1D8BD707-D9CF-40AE-B4C6-C98DA3205C09}" type="datetimeFigureOut">
               <a:rPr lang="en-US" smtClean="0"/>
               <a:pPr/>
-              <a:t>4/13/25</a:t>
+              <a:t>4/17/25</a:t>
             </a:fld>
             <a:endParaRPr lang="en-US"/>
           </a:p>
@@ -1343,7 +1343,7 @@
             <a:fld id="{1D8BD707-D9CF-40AE-B4C6-C98DA3205C09}" type="datetimeFigureOut">
               <a:rPr lang="en-US" smtClean="0"/>
               <a:pPr/>
-              <a:t>4/13/25</a:t>
+              <a:t>4/17/25</a:t>
             </a:fld>
             <a:endParaRPr lang="en-US"/>
           </a:p>
@@ -1759,7 +1759,7 @@
             <a:fld id="{1D8BD707-D9CF-40AE-B4C6-C98DA3205C09}" type="datetimeFigureOut">
               <a:rPr lang="en-US" smtClean="0"/>
               <a:pPr/>
-              <a:t>4/13/25</a:t>
+              <a:t>4/17/25</a:t>
             </a:fld>
             <a:endParaRPr lang="en-US"/>
           </a:p>
@@ -1873,7 +1873,7 @@
             <a:fld id="{1D8BD707-D9CF-40AE-B4C6-C98DA3205C09}" type="datetimeFigureOut">
               <a:rPr lang="en-US" smtClean="0"/>
               <a:pPr/>
-              <a:t>4/13/25</a:t>
+              <a:t>4/17/25</a:t>
             </a:fld>
             <a:endParaRPr lang="en-US"/>
           </a:p>
@@ -1965,7 +1965,7 @@
             <a:fld id="{1D8BD707-D9CF-40AE-B4C6-C98DA3205C09}" type="datetimeFigureOut">
               <a:rPr lang="en-US" smtClean="0"/>
               <a:pPr/>
-              <a:t>4/13/25</a:t>
+              <a:t>4/17/25</a:t>
             </a:fld>
             <a:endParaRPr lang="en-US"/>
           </a:p>
@@ -2237,7 +2237,7 @@
             <a:fld id="{1D8BD707-D9CF-40AE-B4C6-C98DA3205C09}" type="datetimeFigureOut">
               <a:rPr lang="en-US" smtClean="0"/>
               <a:pPr/>
-              <a:t>4/13/25</a:t>
+              <a:t>4/17/25</a:t>
             </a:fld>
             <a:endParaRPr lang="en-US"/>
           </a:p>
@@ -2486,7 +2486,7 @@
             <a:fld id="{1D8BD707-D9CF-40AE-B4C6-C98DA3205C09}" type="datetimeFigureOut">
               <a:rPr lang="en-US" smtClean="0"/>
               <a:pPr/>
-              <a:t>4/13/25</a:t>
+              <a:t>4/17/25</a:t>
             </a:fld>
             <a:endParaRPr lang="en-US"/>
           </a:p>
@@ -2694,7 +2694,7 @@
             <a:fld id="{1D8BD707-D9CF-40AE-B4C6-C98DA3205C09}" type="datetimeFigureOut">
               <a:rPr lang="en-US" smtClean="0"/>
               <a:pPr/>
-              <a:t>4/13/25</a:t>
+              <a:t>4/17/25</a:t>
             </a:fld>
             <a:endParaRPr lang="en-US"/>
           </a:p>
@@ -4852,28 +4852,16 @@
               <a:t>menampilkan</a:t>
             </a:r>
             <a:r>
-              <a:rPr lang="en-US" dirty="0">
-                <a:solidFill>
-                  <a:srgbClr val="404040"/>
-                </a:solidFill>
-                <a:latin typeface="Times New Roman" panose="02020603050405020304" pitchFamily="18" charset="0"/>
-                <a:ea typeface="Public Sans Bold"/>
-                <a:cs typeface="Times New Roman" panose="02020603050405020304" pitchFamily="18" charset="0"/>
-                <a:sym typeface="Public Sans Bold"/>
-              </a:rPr>
-              <a:t> </a:t>
-            </a:r>
-            <a:r>
-              <a:rPr lang="en-US" dirty="0" err="1">
-                <a:solidFill>
-                  <a:srgbClr val="404040"/>
-                </a:solidFill>
-                <a:latin typeface="Times New Roman" panose="02020603050405020304" pitchFamily="18" charset="0"/>
-                <a:ea typeface="Public Sans Bold"/>
-                <a:cs typeface="Times New Roman" panose="02020603050405020304" pitchFamily="18" charset="0"/>
-                <a:sym typeface="Public Sans Bold"/>
-              </a:rPr>
-              <a:t>pengguna</a:t>
+              <a:rPr lang="en-US">
+                <a:solidFill>
+                  <a:srgbClr val="404040"/>
+                </a:solidFill>
+                <a:latin typeface="Times New Roman" panose="02020603050405020304" pitchFamily="18" charset="0"/>
+                <a:ea typeface="Public Sans Bold"/>
+                <a:cs typeface="Times New Roman" panose="02020603050405020304" pitchFamily="18" charset="0"/>
+                <a:sym typeface="Public Sans Bold"/>
+              </a:rPr>
+              <a:t> dashboard pengguna</a:t>
             </a:r>
             <a:r>
               <a:rPr lang="en-US" dirty="0">

</xml_diff>

<commit_message>
feat(view): add and implement main layout
Created reusable layout in app/views/layouts/main.php with shared header and footer for consistent structure across pages.

- Added UI for Home page: arranged and customized content layout for service introduction and call-to-action using Bootstrap grid and components.
- Added UI for About page: structured informational content to describe the purpose and background of the L-ServStat platform.
- Added UI for Services page: listed available car service options with brief descriptions and integrated order form layout.
- Added UI for Contact page: included email and embedded Google Maps for service location.
</commit_message>
<xml_diff>
--- a/lap_minggu2/LSS.pptx
+++ b/lap_minggu2/LSS.pptx
@@ -4852,16 +4852,28 @@
               <a:t>menampilkan</a:t>
             </a:r>
             <a:r>
-              <a:rPr lang="en-US">
-                <a:solidFill>
-                  <a:srgbClr val="404040"/>
-                </a:solidFill>
-                <a:latin typeface="Times New Roman" panose="02020603050405020304" pitchFamily="18" charset="0"/>
-                <a:ea typeface="Public Sans Bold"/>
-                <a:cs typeface="Times New Roman" panose="02020603050405020304" pitchFamily="18" charset="0"/>
-                <a:sym typeface="Public Sans Bold"/>
-              </a:rPr>
-              <a:t> dashboard pengguna</a:t>
+              <a:rPr lang="en-US" dirty="0">
+                <a:solidFill>
+                  <a:srgbClr val="404040"/>
+                </a:solidFill>
+                <a:latin typeface="Times New Roman" panose="02020603050405020304" pitchFamily="18" charset="0"/>
+                <a:ea typeface="Public Sans Bold"/>
+                <a:cs typeface="Times New Roman" panose="02020603050405020304" pitchFamily="18" charset="0"/>
+                <a:sym typeface="Public Sans Bold"/>
+              </a:rPr>
+              <a:t> dashboard </a:t>
+            </a:r>
+            <a:r>
+              <a:rPr lang="en-US" dirty="0" err="1">
+                <a:solidFill>
+                  <a:srgbClr val="404040"/>
+                </a:solidFill>
+                <a:latin typeface="Times New Roman" panose="02020603050405020304" pitchFamily="18" charset="0"/>
+                <a:ea typeface="Public Sans Bold"/>
+                <a:cs typeface="Times New Roman" panose="02020603050405020304" pitchFamily="18" charset="0"/>
+                <a:sym typeface="Public Sans Bold"/>
+              </a:rPr>
+              <a:t>pengguna</a:t>
             </a:r>
             <a:r>
               <a:rPr lang="en-US" dirty="0">
@@ -6931,7 +6943,7 @@
               </a:lnSpc>
             </a:pPr>
             <a:r>
-              <a:rPr lang="en-US" sz="1599" b="1">
+              <a:rPr lang="en-US" sz="1599" b="1" dirty="0" err="1">
                 <a:solidFill>
                   <a:srgbClr val="404040"/>
                 </a:solidFill>
@@ -6940,7 +6952,67 @@
                 <a:cs typeface="Public Sans Bold"/>
                 <a:sym typeface="Public Sans Bold"/>
               </a:rPr>
-              <a:t>Kontrak perkuliahan  &amp; menentukan ide project</a:t>
+              <a:t>Kontrak</a:t>
+            </a:r>
+            <a:r>
+              <a:rPr lang="en-US" sz="1599" b="1" dirty="0">
+                <a:solidFill>
+                  <a:srgbClr val="404040"/>
+                </a:solidFill>
+                <a:latin typeface="Public Sans Bold"/>
+                <a:ea typeface="Public Sans Bold"/>
+                <a:cs typeface="Public Sans Bold"/>
+                <a:sym typeface="Public Sans Bold"/>
+              </a:rPr>
+              <a:t> </a:t>
+            </a:r>
+            <a:r>
+              <a:rPr lang="en-US" sz="1599" b="1" dirty="0" err="1">
+                <a:solidFill>
+                  <a:srgbClr val="404040"/>
+                </a:solidFill>
+                <a:latin typeface="Public Sans Bold"/>
+                <a:ea typeface="Public Sans Bold"/>
+                <a:cs typeface="Public Sans Bold"/>
+                <a:sym typeface="Public Sans Bold"/>
+              </a:rPr>
+              <a:t>perkuliahan</a:t>
+            </a:r>
+            <a:r>
+              <a:rPr lang="en-US" sz="1599" b="1" dirty="0">
+                <a:solidFill>
+                  <a:srgbClr val="404040"/>
+                </a:solidFill>
+                <a:latin typeface="Public Sans Bold"/>
+                <a:ea typeface="Public Sans Bold"/>
+                <a:cs typeface="Public Sans Bold"/>
+                <a:sym typeface="Public Sans Bold"/>
+              </a:rPr>
+              <a:t>  &amp; </a:t>
+            </a:r>
+            <a:r>
+              <a:rPr lang="en-US" sz="1599" b="1" dirty="0" err="1">
+                <a:solidFill>
+                  <a:srgbClr val="404040"/>
+                </a:solidFill>
+                <a:latin typeface="Public Sans Bold"/>
+                <a:ea typeface="Public Sans Bold"/>
+                <a:cs typeface="Public Sans Bold"/>
+                <a:sym typeface="Public Sans Bold"/>
+              </a:rPr>
+              <a:t>menentukan</a:t>
+            </a:r>
+            <a:r>
+              <a:rPr lang="en-US" sz="1599" b="1" dirty="0">
+                <a:solidFill>
+                  <a:srgbClr val="404040"/>
+                </a:solidFill>
+                <a:latin typeface="Public Sans Bold"/>
+                <a:ea typeface="Public Sans Bold"/>
+                <a:cs typeface="Public Sans Bold"/>
+                <a:sym typeface="Public Sans Bold"/>
+              </a:rPr>
+              <a:t> ide project</a:t>
             </a:r>
           </a:p>
         </p:txBody>
@@ -6972,7 +7044,7 @@
               </a:lnSpc>
             </a:pPr>
             <a:r>
-              <a:rPr lang="en-US" sz="1599" b="1">
+              <a:rPr lang="en-US" sz="1599" b="1" dirty="0" err="1">
                 <a:solidFill>
                   <a:srgbClr val="404040"/>
                 </a:solidFill>
@@ -6981,8 +7053,41 @@
                 <a:cs typeface="Public Sans Bold"/>
                 <a:sym typeface="Public Sans Bold"/>
               </a:rPr>
-              <a:t>Perancangan timeline  aplikasi</a:t>
-            </a:r>
+              <a:t>Perancangan</a:t>
+            </a:r>
+            <a:r>
+              <a:rPr lang="en-US" sz="1599" b="1" dirty="0">
+                <a:solidFill>
+                  <a:srgbClr val="404040"/>
+                </a:solidFill>
+                <a:latin typeface="Public Sans Bold"/>
+                <a:ea typeface="Public Sans Bold"/>
+                <a:cs typeface="Public Sans Bold"/>
+                <a:sym typeface="Public Sans Bold"/>
+              </a:rPr>
+              <a:t> timeline  </a:t>
+            </a:r>
+            <a:r>
+              <a:rPr lang="en-US" sz="1599" b="1" dirty="0" err="1">
+                <a:solidFill>
+                  <a:srgbClr val="404040"/>
+                </a:solidFill>
+                <a:latin typeface="Public Sans Bold"/>
+                <a:ea typeface="Public Sans Bold"/>
+                <a:cs typeface="Public Sans Bold"/>
+                <a:sym typeface="Public Sans Bold"/>
+              </a:rPr>
+              <a:t>aplikasi</a:t>
+            </a:r>
+            <a:endParaRPr lang="en-US" sz="1599" b="1" dirty="0">
+              <a:solidFill>
+                <a:srgbClr val="404040"/>
+              </a:solidFill>
+              <a:latin typeface="Public Sans Bold"/>
+              <a:ea typeface="Public Sans Bold"/>
+              <a:cs typeface="Public Sans Bold"/>
+              <a:sym typeface="Public Sans Bold"/>
+            </a:endParaRPr>
           </a:p>
         </p:txBody>
       </p:sp>
@@ -7090,7 +7195,7 @@
               </a:lnSpc>
             </a:pPr>
             <a:r>
-              <a:rPr lang="en-US" sz="1599" b="1">
+              <a:rPr lang="en-US" sz="1599" b="1" dirty="0">
                 <a:solidFill>
                   <a:srgbClr val="404040"/>
                 </a:solidFill>
@@ -7172,7 +7277,7 @@
               </a:lnSpc>
             </a:pPr>
             <a:r>
-              <a:rPr lang="en-US" sz="1599" b="1">
+              <a:rPr lang="en-US" sz="1599" b="1" dirty="0">
                 <a:solidFill>
                   <a:srgbClr val="404040"/>
                 </a:solidFill>
@@ -7191,7 +7296,7 @@
               </a:lnSpc>
             </a:pPr>
             <a:r>
-              <a:rPr lang="en-US" sz="1599" b="1">
+              <a:rPr lang="en-US" sz="1599" b="1" dirty="0">
                 <a:solidFill>
                   <a:srgbClr val="404040"/>
                 </a:solidFill>
@@ -7273,7 +7378,7 @@
               </a:lnSpc>
             </a:pPr>
             <a:r>
-              <a:rPr lang="en-US" sz="1599" b="1">
+              <a:rPr lang="en-US" sz="1599" b="1" dirty="0">
                 <a:solidFill>
                   <a:srgbClr val="404040"/>
                 </a:solidFill>
@@ -7282,7 +7387,31 @@
                 <a:cs typeface="Public Sans Bold"/>
                 <a:sym typeface="Public Sans Bold"/>
               </a:rPr>
-              <a:t>Backend, testing, perbaikan bug</a:t>
+              <a:t>Backend, testing, </a:t>
+            </a:r>
+            <a:r>
+              <a:rPr lang="en-US" sz="1599" b="1" dirty="0" err="1">
+                <a:solidFill>
+                  <a:srgbClr val="404040"/>
+                </a:solidFill>
+                <a:latin typeface="Public Sans Bold"/>
+                <a:ea typeface="Public Sans Bold"/>
+                <a:cs typeface="Public Sans Bold"/>
+                <a:sym typeface="Public Sans Bold"/>
+              </a:rPr>
+              <a:t>perbaikan</a:t>
+            </a:r>
+            <a:r>
+              <a:rPr lang="en-US" sz="1599" b="1" dirty="0">
+                <a:solidFill>
+                  <a:srgbClr val="404040"/>
+                </a:solidFill>
+                <a:latin typeface="Public Sans Bold"/>
+                <a:ea typeface="Public Sans Bold"/>
+                <a:cs typeface="Public Sans Bold"/>
+                <a:sym typeface="Public Sans Bold"/>
+              </a:rPr>
+              <a:t> bug</a:t>
             </a:r>
           </a:p>
           <a:p>
@@ -7291,7 +7420,7 @@
                 <a:spcPts val="1919"/>
               </a:lnSpc>
             </a:pPr>
-            <a:endParaRPr lang="en-US" sz="1599" b="1">
+            <a:endParaRPr lang="en-US" sz="1599" b="1" dirty="0">
               <a:solidFill>
                 <a:srgbClr val="404040"/>
               </a:solidFill>

</xml_diff>